<commit_message>
Added report and PPT
</commit_message>
<xml_diff>
--- a/Report & PPT/Review ppt.pptx
+++ b/Report & PPT/Review ppt.pptx
@@ -132,7 +132,7 @@
   </p:defaultTextStyle>
   <p:extLst>
     <p:ext uri="{EFAFB233-063F-42B5-8137-9DF3F51BA10A}">
-      <p15:sldGuideLst xmlns="" xmlns:p15="http://schemas.microsoft.com/office/powerpoint/2012/main">
+      <p15:sldGuideLst xmlns:p15="http://schemas.microsoft.com/office/powerpoint/2012/main" xmlns="">
         <p15:guide id="1" orient="horz" pos="2160">
           <p15:clr>
             <a:srgbClr val="A4A3A4"/>
@@ -154,7 +154,7 @@
   <p:cmAuthor id="1" name="Kautilya Bhat" initials="KB" lastIdx="1" clrIdx="0">
     <p:extLst>
       <p:ext uri="{19B8F6BF-5375-455C-9EA6-DF929625EA0E}">
-        <p15:presenceInfo xmlns="" xmlns:p15="http://schemas.microsoft.com/office/powerpoint/2012/main" userId="2927c8f636482167" providerId="Windows Live"/>
+        <p15:presenceInfo xmlns:p15="http://schemas.microsoft.com/office/powerpoint/2012/main" xmlns="" userId="2927c8f636482167" providerId="Windows Live"/>
       </p:ext>
     </p:extLst>
   </p:cmAuthor>
@@ -244,7 +244,7 @@
             <a:fld id="{EEEC74C7-5A1B-48CE-B706-051F559F30D0}" type="datetimeFigureOut">
               <a:rPr lang="en-IN" smtClean="0"/>
               <a:pPr/>
-              <a:t>12-03-2020</a:t>
+              <a:t>19-04-2020</a:t>
             </a:fld>
             <a:endParaRPr lang="en-IN"/>
           </a:p>
@@ -1308,7 +1308,7 @@
           <a:p>
             <a:fld id="{1814001B-DB1C-4649-91AE-5AF503FACA4B}" type="datetime1">
               <a:rPr lang="en-US" smtClean="0"/>
-              <a:t>3/12/2020</a:t>
+              <a:t>4/19/2020</a:t>
             </a:fld>
             <a:endParaRPr lang="en-US" dirty="0"/>
           </a:p>
@@ -1509,7 +1509,7 @@
           <a:p>
             <a:fld id="{9DB8BA51-A37D-41E2-8434-2AA90AA36288}" type="datetime1">
               <a:rPr lang="en-US" smtClean="0"/>
-              <a:t>3/12/2020</a:t>
+              <a:t>4/19/2020</a:t>
             </a:fld>
             <a:endParaRPr lang="en-US" dirty="0"/>
           </a:p>
@@ -1699,7 +1699,7 @@
           <a:p>
             <a:fld id="{15C4EE79-C4CA-43C0-8AED-2A57EBFE3296}" type="datetime1">
               <a:rPr lang="en-US" smtClean="0"/>
-              <a:t>3/12/2020</a:t>
+              <a:t>4/19/2020</a:t>
             </a:fld>
             <a:endParaRPr lang="en-US" dirty="0"/>
           </a:p>
@@ -1854,7 +1854,7 @@
           <a:p>
             <a:fld id="{9C4B4AC9-AB30-4C56-9817-63C9D9EA6A1E}" type="datetime1">
               <a:rPr lang="en-US" smtClean="0"/>
-              <a:t>3/12/2020</a:t>
+              <a:t>4/19/2020</a:t>
             </a:fld>
             <a:endParaRPr lang="en-US" dirty="0"/>
           </a:p>
@@ -2114,7 +2114,7 @@
           <a:p>
             <a:fld id="{96C5B282-4CC6-4FBD-B0B3-6FB4376CD96D}" type="datetime1">
               <a:rPr lang="en-US" smtClean="0"/>
-              <a:t>3/12/2020</a:t>
+              <a:t>4/19/2020</a:t>
             </a:fld>
             <a:endParaRPr lang="en-US" dirty="0"/>
           </a:p>
@@ -2528,7 +2528,7 @@
           <a:p>
             <a:fld id="{B460B64C-66B2-4E59-AA1C-0B0A9DEB1D8B}" type="datetime1">
               <a:rPr lang="en-US" smtClean="0"/>
-              <a:t>3/12/2020</a:t>
+              <a:t>4/19/2020</a:t>
             </a:fld>
             <a:endParaRPr lang="en-US" dirty="0"/>
           </a:p>
@@ -2979,7 +2979,7 @@
           <a:p>
             <a:fld id="{C8A77211-0F4E-4E53-8705-50872B20E74D}" type="datetime1">
               <a:rPr lang="en-US" smtClean="0"/>
-              <a:t>3/12/2020</a:t>
+              <a:t>4/19/2020</a:t>
             </a:fld>
             <a:endParaRPr lang="en-US" dirty="0"/>
           </a:p>
@@ -3085,7 +3085,7 @@
           <a:p>
             <a:fld id="{D2451C81-C017-4E7C-A51B-AA92B37CF989}" type="datetime1">
               <a:rPr lang="en-US" smtClean="0"/>
-              <a:t>3/12/2020</a:t>
+              <a:t>4/19/2020</a:t>
             </a:fld>
             <a:endParaRPr lang="en-US" dirty="0"/>
           </a:p>
@@ -3211,7 +3211,7 @@
           <a:p>
             <a:fld id="{9E03196F-9759-418D-9BEF-E910E713E98B}" type="datetime1">
               <a:rPr lang="en-US" smtClean="0"/>
-              <a:t>3/12/2020</a:t>
+              <a:t>4/19/2020</a:t>
             </a:fld>
             <a:endParaRPr lang="en-US" dirty="0"/>
           </a:p>
@@ -3490,7 +3490,7 @@
           <a:p>
             <a:fld id="{2FA96642-92DD-4AC9-8FFB-DCCC0E1EEFF5}" type="datetime1">
               <a:rPr lang="en-US" smtClean="0"/>
-              <a:t>3/12/2020</a:t>
+              <a:t>4/19/2020</a:t>
             </a:fld>
             <a:endParaRPr lang="en-US" dirty="0"/>
           </a:p>
@@ -3700,7 +3700,7 @@
           <a:p>
             <a:fld id="{0551F104-C2FF-45D0-B26C-63316EB91CE4}" type="datetime1">
               <a:rPr lang="en-US" smtClean="0"/>
-              <a:t>3/12/2020</a:t>
+              <a:t>4/19/2020</a:t>
             </a:fld>
             <a:endParaRPr lang="en-US" dirty="0"/>
           </a:p>
@@ -4814,7 +4814,7 @@
           <a:p>
             <a:fld id="{0E76007C-1CCA-4DB5-9AA6-0D5E967C3ACD}" type="datetime1">
               <a:rPr lang="en-US" smtClean="0"/>
-              <a:t>3/12/2020</a:t>
+              <a:t>4/19/2020</a:t>
             </a:fld>
             <a:endParaRPr lang="en-US" dirty="0"/>
           </a:p>
@@ -5232,7 +5232,7 @@
           <p:cNvPr id="3" name="Slide Number Placeholder 2">
             <a:extLst>
               <a:ext uri="{FF2B5EF4-FFF2-40B4-BE49-F238E27FC236}">
-                <a16:creationId xmlns="" xmlns:a16="http://schemas.microsoft.com/office/drawing/2014/main" id="{64B12F98-E2FA-4D15-B0C6-801CBB25EB74}"/>
+                <a16:creationId xmlns:a16="http://schemas.microsoft.com/office/drawing/2014/main" xmlns="" id="{64B12F98-E2FA-4D15-B0C6-801CBB25EB74}"/>
               </a:ext>
             </a:extLst>
           </p:cNvPr>
@@ -5267,8 +5267,8 @@
         </p:nvSpPr>
         <p:spPr bwMode="auto">
           <a:xfrm>
-            <a:off x="661737" y="35279"/>
-            <a:ext cx="10768263" cy="6719756"/>
+            <a:off x="661737" y="104529"/>
+            <a:ext cx="10768263" cy="6581257"/>
           </a:xfrm>
           <a:prstGeom prst="rect">
             <a:avLst/>
@@ -5550,16 +5550,15 @@
                 <a:latin typeface="Times New Roman" pitchFamily="18" charset="0"/>
                 <a:cs typeface="Times New Roman" pitchFamily="18" charset="0"/>
               </a:rPr>
-              <a:t>MACHINE LEARNING</a:t>
-            </a:r>
-            <a:endParaRPr kumimoji="0" lang="en-US" sz="1100" b="0" i="0" u="none" strike="noStrike" cap="none" normalizeH="0" baseline="0" dirty="0">
-              <a:ln>
-                <a:noFill/>
-              </a:ln>
-              <a:effectLst/>
-              <a:latin typeface="Times New Roman" pitchFamily="18" charset="0"/>
-              <a:cs typeface="Times New Roman" pitchFamily="18" charset="0"/>
-            </a:endParaRPr>
+              <a:t>MACHINE </a:t>
+            </a:r>
+            <a:r>
+              <a:rPr lang="en-US" sz="2400" b="1" dirty="0" smtClean="0">
+                <a:latin typeface="Times New Roman" pitchFamily="18" charset="0"/>
+                <a:cs typeface="Times New Roman" pitchFamily="18" charset="0"/>
+              </a:rPr>
+              <a:t>LEARNING</a:t>
+            </a:r>
           </a:p>
           <a:p>
             <a:pPr marL="0" marR="0" lvl="0" indent="0" algn="ctr" defTabSz="914400" rtl="0" eaLnBrk="0" fontAlgn="base" latinLnBrk="0" hangingPunct="0">
@@ -5579,7 +5578,7 @@
               <a:tabLst/>
             </a:pPr>
             <a:r>
-              <a:rPr kumimoji="0" lang="en-US" sz="1800" b="0" i="0" u="none" strike="noStrike" cap="none" normalizeH="0" baseline="0" dirty="0">
+              <a:rPr kumimoji="0" lang="en-US" sz="2400" b="1" i="0" u="none" strike="noStrike" cap="none" normalizeH="0" baseline="0" smtClean="0">
                 <a:ln>
                   <a:noFill/>
                 </a:ln>
@@ -5587,36 +5586,10 @@
                 <a:latin typeface="Times New Roman" pitchFamily="18" charset="0"/>
                 <a:cs typeface="Times New Roman" pitchFamily="18" charset="0"/>
               </a:rPr>
-              <a:t>Presented by</a:t>
-            </a:r>
-            <a:endParaRPr kumimoji="0" lang="en-US" sz="1100" b="0" i="0" u="none" strike="noStrike" cap="none" normalizeH="0" baseline="0" dirty="0">
-              <a:ln>
-                <a:noFill/>
-              </a:ln>
-              <a:effectLst/>
-              <a:latin typeface="Times New Roman" pitchFamily="18" charset="0"/>
-              <a:cs typeface="Times New Roman" pitchFamily="18" charset="0"/>
-            </a:endParaRPr>
-          </a:p>
-          <a:p>
-            <a:pPr marL="0" marR="0" lvl="0" indent="0" algn="ctr" defTabSz="914400" rtl="0" eaLnBrk="0" fontAlgn="base" latinLnBrk="0" hangingPunct="0">
-              <a:lnSpc>
-                <a:spcPct val="100000"/>
-              </a:lnSpc>
-              <a:spcBef>
-                <a:spcPct val="0"/>
-              </a:spcBef>
-              <a:spcAft>
-                <a:spcPct val="0"/>
-              </a:spcAft>
-              <a:buClrTx/>
-              <a:buSzTx/>
-              <a:buFontTx/>
-              <a:buNone/>
-              <a:tabLst/>
-            </a:pPr>
-            <a:r>
-              <a:rPr kumimoji="0" lang="en-US" sz="1600" b="1" i="0" u="none" strike="noStrike" cap="none" normalizeH="0" baseline="0" dirty="0">
+              <a:t>“Face</a:t>
+            </a:r>
+            <a:r>
+              <a:rPr kumimoji="0" lang="en-US" sz="2400" b="1" i="0" u="none" strike="noStrike" cap="none" normalizeH="0" smtClean="0">
                 <a:ln>
                   <a:noFill/>
                 </a:ln>
@@ -5624,10 +5597,10 @@
                 <a:latin typeface="Times New Roman" pitchFamily="18" charset="0"/>
                 <a:cs typeface="Times New Roman" pitchFamily="18" charset="0"/>
               </a:rPr>
-              <a:t/>
-            </a:r>
-            <a:br>
-              <a:rPr kumimoji="0" lang="en-US" sz="1600" b="1" i="0" u="none" strike="noStrike" cap="none" normalizeH="0" baseline="0" dirty="0">
+              <a:t> </a:t>
+            </a:r>
+            <a:r>
+              <a:rPr kumimoji="0" lang="en-US" sz="2400" b="1" i="0" u="none" strike="noStrike" cap="none" normalizeH="0" dirty="0" smtClean="0">
                 <a:ln>
                   <a:noFill/>
                 </a:ln>
@@ -5635,49 +5608,10 @@
                 <a:latin typeface="Times New Roman" pitchFamily="18" charset="0"/>
                 <a:cs typeface="Times New Roman" pitchFamily="18" charset="0"/>
               </a:rPr>
-            </a:br>
-            <a:endParaRPr kumimoji="0" lang="en-US" sz="1100" b="0" i="0" u="none" strike="noStrike" cap="none" normalizeH="0" baseline="0" dirty="0">
-              <a:ln>
-                <a:noFill/>
-              </a:ln>
-              <a:effectLst/>
-              <a:latin typeface="Times New Roman" pitchFamily="18" charset="0"/>
-              <a:cs typeface="Times New Roman" pitchFamily="18" charset="0"/>
-            </a:endParaRPr>
-          </a:p>
-          <a:p>
-            <a:pPr marL="0" marR="0" lvl="0" indent="0" algn="ctr" defTabSz="914400" rtl="0" eaLnBrk="0" fontAlgn="base" latinLnBrk="0" hangingPunct="0">
-              <a:lnSpc>
-                <a:spcPct val="100000"/>
-              </a:lnSpc>
-              <a:spcBef>
-                <a:spcPct val="0"/>
-              </a:spcBef>
-              <a:spcAft>
-                <a:spcPct val="0"/>
-              </a:spcAft>
-              <a:buClrTx/>
-              <a:buSzTx/>
-              <a:buFontTx/>
-              <a:buNone/>
-              <a:tabLst/>
-            </a:pPr>
-            <a:r>
-              <a:rPr lang="en-US" sz="1600" b="1" dirty="0">
-                <a:latin typeface="Times New Roman" pitchFamily="18" charset="0"/>
-                <a:cs typeface="Times New Roman" pitchFamily="18" charset="0"/>
-              </a:rPr>
-              <a:t>ASHWIN RAMESH P</a:t>
-            </a:r>
-            <a:r>
-              <a:rPr lang="en-US" sz="1100" dirty="0">
-                <a:latin typeface="Times New Roman" pitchFamily="18" charset="0"/>
-                <a:cs typeface="Times New Roman" pitchFamily="18" charset="0"/>
-              </a:rPr>
-              <a:t>             </a:t>
-            </a:r>
-            <a:r>
-              <a:rPr kumimoji="0" lang="en-US" sz="1600" b="1" i="0" u="none" strike="noStrike" cap="none" normalizeH="0" baseline="0" dirty="0">
+              <a:t>Recognition based Attendance </a:t>
+            </a:r>
+            <a:r>
+              <a:rPr kumimoji="0" lang="en-US" sz="2400" b="1" i="0" u="none" strike="noStrike" cap="none" normalizeH="0" smtClean="0">
                 <a:ln>
                   <a:noFill/>
                 </a:ln>
@@ -5685,211 +5619,13 @@
                 <a:latin typeface="Times New Roman" pitchFamily="18" charset="0"/>
                 <a:cs typeface="Times New Roman" pitchFamily="18" charset="0"/>
               </a:rPr>
-              <a:t>1SG16IS016</a:t>
-            </a:r>
-          </a:p>
-          <a:p>
-            <a:pPr lvl="0" algn="ctr" defTabSz="914400" eaLnBrk="0" fontAlgn="base" hangingPunct="0">
-              <a:spcBef>
-                <a:spcPct val="0"/>
-              </a:spcBef>
-              <a:spcAft>
-                <a:spcPct val="0"/>
-              </a:spcAft>
-            </a:pPr>
-            <a:r>
-              <a:rPr lang="en-US" sz="1600" b="1" dirty="0">
-                <a:latin typeface="Times New Roman" pitchFamily="18" charset="0"/>
-                <a:cs typeface="Times New Roman" pitchFamily="18" charset="0"/>
-              </a:rPr>
-              <a:t>KAUTILYA K BHAT</a:t>
-            </a:r>
-            <a:r>
-              <a:rPr lang="en-US" sz="1100" dirty="0">
-                <a:latin typeface="Times New Roman" pitchFamily="18" charset="0"/>
-                <a:cs typeface="Times New Roman" pitchFamily="18" charset="0"/>
-              </a:rPr>
-              <a:t>        </a:t>
-            </a:r>
-            <a:r>
-              <a:rPr lang="en-US" sz="1100" dirty="0" smtClean="0">
-                <a:latin typeface="Times New Roman" pitchFamily="18" charset="0"/>
-                <a:cs typeface="Times New Roman" pitchFamily="18" charset="0"/>
-              </a:rPr>
-              <a:t>        </a:t>
-            </a:r>
-            <a:r>
-              <a:rPr lang="en-US" sz="1600" b="1" dirty="0">
-                <a:latin typeface="Times New Roman" pitchFamily="18" charset="0"/>
-                <a:cs typeface="Times New Roman" pitchFamily="18" charset="0"/>
-              </a:rPr>
-              <a:t>1SG16IS044</a:t>
-            </a:r>
-            <a:endParaRPr lang="en-US" sz="1100" dirty="0">
-              <a:latin typeface="Times New Roman" pitchFamily="18" charset="0"/>
-              <a:cs typeface="Times New Roman" pitchFamily="18" charset="0"/>
-            </a:endParaRPr>
-          </a:p>
-          <a:p>
-            <a:pPr lvl="0" algn="ctr" defTabSz="914400" eaLnBrk="0" fontAlgn="base" hangingPunct="0">
-              <a:spcBef>
-                <a:spcPct val="0"/>
-              </a:spcBef>
-              <a:spcAft>
-                <a:spcPct val="0"/>
-              </a:spcAft>
-            </a:pPr>
-            <a:r>
-              <a:rPr lang="en-US" sz="1600" b="1" dirty="0">
-                <a:latin typeface="Times New Roman" pitchFamily="18" charset="0"/>
-                <a:cs typeface="Times New Roman" pitchFamily="18" charset="0"/>
-              </a:rPr>
-              <a:t>KEERTHANA G</a:t>
-            </a:r>
-            <a:r>
-              <a:rPr lang="en-US" sz="1100" dirty="0">
-                <a:latin typeface="Times New Roman" pitchFamily="18" charset="0"/>
-                <a:cs typeface="Times New Roman" pitchFamily="18" charset="0"/>
-              </a:rPr>
-              <a:t>            </a:t>
-            </a:r>
-            <a:r>
-              <a:rPr lang="en-US" sz="1100" dirty="0" smtClean="0">
-                <a:latin typeface="Times New Roman" pitchFamily="18" charset="0"/>
-                <a:cs typeface="Times New Roman" pitchFamily="18" charset="0"/>
-              </a:rPr>
-              <a:t>              </a:t>
-            </a:r>
-            <a:r>
-              <a:rPr lang="en-US" sz="1600" b="1" dirty="0">
-                <a:latin typeface="Times New Roman" pitchFamily="18" charset="0"/>
-                <a:cs typeface="Times New Roman" pitchFamily="18" charset="0"/>
-              </a:rPr>
-              <a:t>1SG16IS045</a:t>
-            </a:r>
-            <a:endParaRPr lang="en-US" sz="1100" dirty="0">
-              <a:latin typeface="Times New Roman" pitchFamily="18" charset="0"/>
-              <a:cs typeface="Times New Roman" pitchFamily="18" charset="0"/>
-            </a:endParaRPr>
-          </a:p>
-          <a:p>
-            <a:pPr lvl="0" algn="ctr" defTabSz="914400" eaLnBrk="0" fontAlgn="base" hangingPunct="0">
-              <a:spcBef>
-                <a:spcPct val="0"/>
-              </a:spcBef>
-              <a:spcAft>
-                <a:spcPct val="0"/>
-              </a:spcAft>
-            </a:pPr>
-            <a:r>
-              <a:rPr lang="en-US" sz="1600" b="1" dirty="0">
-                <a:latin typeface="Times New Roman" pitchFamily="18" charset="0"/>
-                <a:cs typeface="Times New Roman" pitchFamily="18" charset="0"/>
-              </a:rPr>
-              <a:t>HARISH BABU</a:t>
-            </a:r>
-            <a:r>
-              <a:rPr lang="en-US" sz="1100" dirty="0">
-                <a:latin typeface="Times New Roman" pitchFamily="18" charset="0"/>
-                <a:cs typeface="Times New Roman" pitchFamily="18" charset="0"/>
-              </a:rPr>
-              <a:t>            </a:t>
-            </a:r>
-            <a:r>
-              <a:rPr lang="en-US" sz="1100" dirty="0" smtClean="0">
-                <a:latin typeface="Times New Roman" pitchFamily="18" charset="0"/>
-                <a:cs typeface="Times New Roman" pitchFamily="18" charset="0"/>
-              </a:rPr>
-              <a:t>                </a:t>
-            </a:r>
-            <a:r>
-              <a:rPr lang="en-US" sz="1600" b="1" dirty="0">
-                <a:latin typeface="Times New Roman" pitchFamily="18" charset="0"/>
-                <a:cs typeface="Times New Roman" pitchFamily="18" charset="0"/>
-              </a:rPr>
-              <a:t>1SG16IS034</a:t>
-            </a:r>
-          </a:p>
-          <a:p>
-            <a:pPr lvl="0" algn="ctr" defTabSz="914400" eaLnBrk="0" fontAlgn="base" hangingPunct="0">
-              <a:spcBef>
-                <a:spcPct val="0"/>
-              </a:spcBef>
-              <a:spcAft>
-                <a:spcPct val="0"/>
-              </a:spcAft>
-            </a:pPr>
-            <a:r>
-              <a:rPr lang="en-US" sz="1600" b="1" dirty="0">
-                <a:latin typeface="Times New Roman" pitchFamily="18" charset="0"/>
-                <a:cs typeface="Times New Roman" pitchFamily="18" charset="0"/>
-              </a:rPr>
-              <a:t>MANJUNATH S</a:t>
-            </a:r>
-            <a:r>
-              <a:rPr lang="en-US" sz="1100" dirty="0">
-                <a:latin typeface="Times New Roman" pitchFamily="18" charset="0"/>
-                <a:cs typeface="Times New Roman" pitchFamily="18" charset="0"/>
-              </a:rPr>
-              <a:t>            </a:t>
-            </a:r>
-            <a:r>
-              <a:rPr lang="en-US" sz="1100" dirty="0" smtClean="0">
-                <a:latin typeface="Times New Roman" pitchFamily="18" charset="0"/>
-                <a:cs typeface="Times New Roman" pitchFamily="18" charset="0"/>
-              </a:rPr>
-              <a:t>              </a:t>
-            </a:r>
-            <a:r>
-              <a:rPr lang="en-US" sz="1600" b="1" dirty="0">
-                <a:latin typeface="Times New Roman" pitchFamily="18" charset="0"/>
-                <a:cs typeface="Times New Roman" pitchFamily="18" charset="0"/>
-              </a:rPr>
-              <a:t>1SG16IS056</a:t>
-            </a:r>
-            <a:endParaRPr lang="en-US" sz="1100" dirty="0">
-              <a:latin typeface="Times New Roman" pitchFamily="18" charset="0"/>
-              <a:cs typeface="Times New Roman" pitchFamily="18" charset="0"/>
-            </a:endParaRPr>
-          </a:p>
-          <a:p>
-            <a:pPr lvl="0" algn="ctr" defTabSz="914400" eaLnBrk="0" fontAlgn="base" hangingPunct="0">
-              <a:spcBef>
-                <a:spcPct val="0"/>
-              </a:spcBef>
-              <a:spcAft>
-                <a:spcPct val="0"/>
-              </a:spcAft>
-            </a:pPr>
-            <a:endParaRPr lang="en-US" sz="1100" dirty="0">
-              <a:latin typeface="Times New Roman" pitchFamily="18" charset="0"/>
-              <a:cs typeface="Times New Roman" pitchFamily="18" charset="0"/>
-            </a:endParaRPr>
-          </a:p>
-          <a:p>
-            <a:pPr lvl="0" algn="ctr" defTabSz="914400" eaLnBrk="0" fontAlgn="base" hangingPunct="0">
-              <a:spcBef>
-                <a:spcPct val="0"/>
-              </a:spcBef>
-              <a:spcAft>
-                <a:spcPct val="0"/>
-              </a:spcAft>
-            </a:pPr>
-            <a:endParaRPr lang="en-US" sz="1100" dirty="0">
-              <a:latin typeface="Times New Roman" pitchFamily="18" charset="0"/>
-              <a:cs typeface="Times New Roman" pitchFamily="18" charset="0"/>
-            </a:endParaRPr>
-          </a:p>
-          <a:p>
-            <a:pPr lvl="0" algn="ctr" defTabSz="914400" eaLnBrk="0" fontAlgn="base" hangingPunct="0">
-              <a:spcBef>
-                <a:spcPct val="0"/>
-              </a:spcBef>
-              <a:spcAft>
-                <a:spcPct val="0"/>
-              </a:spcAft>
-            </a:pPr>
-            <a:endParaRPr lang="en-US" sz="1100" dirty="0">
+              <a:t>Management System”</a:t>
+            </a:r>
+            <a:endParaRPr kumimoji="0" lang="en-US" sz="2400" b="1" i="0" u="none" strike="noStrike" cap="none" normalizeH="0" baseline="0" dirty="0">
+              <a:ln>
+                <a:noFill/>
+              </a:ln>
+              <a:effectLst/>
               <a:latin typeface="Times New Roman" pitchFamily="18" charset="0"/>
               <a:cs typeface="Times New Roman" pitchFamily="18" charset="0"/>
             </a:endParaRPr>
@@ -5916,6 +5652,297 @@
                 <a:noFill/>
               </a:ln>
               <a:effectLst/>
+              <a:latin typeface="Times New Roman" pitchFamily="18" charset="0"/>
+              <a:cs typeface="Times New Roman" pitchFamily="18" charset="0"/>
+            </a:endParaRPr>
+          </a:p>
+          <a:p>
+            <a:pPr marL="0" marR="0" lvl="0" indent="0" algn="ctr" defTabSz="914400" rtl="0" eaLnBrk="0" fontAlgn="base" latinLnBrk="0" hangingPunct="0">
+              <a:lnSpc>
+                <a:spcPct val="100000"/>
+              </a:lnSpc>
+              <a:spcBef>
+                <a:spcPct val="0"/>
+              </a:spcBef>
+              <a:spcAft>
+                <a:spcPct val="0"/>
+              </a:spcAft>
+              <a:buClrTx/>
+              <a:buSzTx/>
+              <a:buFontTx/>
+              <a:buNone/>
+              <a:tabLst/>
+            </a:pPr>
+            <a:r>
+              <a:rPr kumimoji="0" lang="en-US" sz="1800" b="0" i="0" u="none" strike="noStrike" cap="none" normalizeH="0" baseline="0" dirty="0">
+                <a:ln>
+                  <a:noFill/>
+                </a:ln>
+                <a:effectLst/>
+                <a:latin typeface="Times New Roman" pitchFamily="18" charset="0"/>
+                <a:cs typeface="Times New Roman" pitchFamily="18" charset="0"/>
+              </a:rPr>
+              <a:t>Presented by</a:t>
+            </a:r>
+            <a:endParaRPr kumimoji="0" lang="en-US" sz="1100" b="0" i="0" u="none" strike="noStrike" cap="none" normalizeH="0" baseline="0" dirty="0">
+              <a:ln>
+                <a:noFill/>
+              </a:ln>
+              <a:effectLst/>
+              <a:latin typeface="Times New Roman" pitchFamily="18" charset="0"/>
+              <a:cs typeface="Times New Roman" pitchFamily="18" charset="0"/>
+            </a:endParaRPr>
+          </a:p>
+          <a:p>
+            <a:pPr marL="0" marR="0" lvl="0" indent="0" algn="ctr" defTabSz="914400" rtl="0" eaLnBrk="0" fontAlgn="base" latinLnBrk="0" hangingPunct="0">
+              <a:lnSpc>
+                <a:spcPct val="100000"/>
+              </a:lnSpc>
+              <a:spcBef>
+                <a:spcPct val="0"/>
+              </a:spcBef>
+              <a:spcAft>
+                <a:spcPct val="0"/>
+              </a:spcAft>
+              <a:buClrTx/>
+              <a:buSzTx/>
+              <a:buFontTx/>
+              <a:buNone/>
+              <a:tabLst/>
+            </a:pPr>
+            <a:r>
+              <a:rPr kumimoji="0" lang="en-US" sz="1600" b="1" i="0" u="none" strike="noStrike" cap="none" normalizeH="0" baseline="0" dirty="0">
+                <a:ln>
+                  <a:noFill/>
+                </a:ln>
+                <a:effectLst/>
+                <a:latin typeface="Times New Roman" pitchFamily="18" charset="0"/>
+                <a:cs typeface="Times New Roman" pitchFamily="18" charset="0"/>
+              </a:rPr>
+              <a:t/>
+            </a:r>
+            <a:br>
+              <a:rPr kumimoji="0" lang="en-US" sz="1600" b="1" i="0" u="none" strike="noStrike" cap="none" normalizeH="0" baseline="0" dirty="0">
+                <a:ln>
+                  <a:noFill/>
+                </a:ln>
+                <a:effectLst/>
+                <a:latin typeface="Times New Roman" pitchFamily="18" charset="0"/>
+                <a:cs typeface="Times New Roman" pitchFamily="18" charset="0"/>
+              </a:rPr>
+            </a:br>
+            <a:endParaRPr kumimoji="0" lang="en-US" sz="1100" b="0" i="0" u="none" strike="noStrike" cap="none" normalizeH="0" baseline="0" dirty="0">
+              <a:ln>
+                <a:noFill/>
+              </a:ln>
+              <a:effectLst/>
+              <a:latin typeface="Times New Roman" pitchFamily="18" charset="0"/>
+              <a:cs typeface="Times New Roman" pitchFamily="18" charset="0"/>
+            </a:endParaRPr>
+          </a:p>
+          <a:p>
+            <a:pPr marL="0" marR="0" lvl="0" indent="0" algn="ctr" defTabSz="914400" rtl="0" eaLnBrk="0" fontAlgn="base" latinLnBrk="0" hangingPunct="0">
+              <a:lnSpc>
+                <a:spcPct val="100000"/>
+              </a:lnSpc>
+              <a:spcBef>
+                <a:spcPct val="0"/>
+              </a:spcBef>
+              <a:spcAft>
+                <a:spcPct val="0"/>
+              </a:spcAft>
+              <a:buClrTx/>
+              <a:buSzTx/>
+              <a:buFontTx/>
+              <a:buNone/>
+              <a:tabLst/>
+            </a:pPr>
+            <a:r>
+              <a:rPr lang="en-US" sz="1600" b="1" dirty="0">
+                <a:latin typeface="Times New Roman" pitchFamily="18" charset="0"/>
+                <a:cs typeface="Times New Roman" pitchFamily="18" charset="0"/>
+              </a:rPr>
+              <a:t>ASHWIN RAMESH P</a:t>
+            </a:r>
+            <a:r>
+              <a:rPr lang="en-US" sz="1100" dirty="0">
+                <a:latin typeface="Times New Roman" pitchFamily="18" charset="0"/>
+                <a:cs typeface="Times New Roman" pitchFamily="18" charset="0"/>
+              </a:rPr>
+              <a:t>             </a:t>
+            </a:r>
+            <a:r>
+              <a:rPr kumimoji="0" lang="en-US" sz="1600" b="1" i="0" u="none" strike="noStrike" cap="none" normalizeH="0" baseline="0" dirty="0">
+                <a:ln>
+                  <a:noFill/>
+                </a:ln>
+                <a:effectLst/>
+                <a:latin typeface="Times New Roman" pitchFamily="18" charset="0"/>
+                <a:cs typeface="Times New Roman" pitchFamily="18" charset="0"/>
+              </a:rPr>
+              <a:t>1SG16IS016</a:t>
+            </a:r>
+          </a:p>
+          <a:p>
+            <a:pPr lvl="0" algn="ctr" defTabSz="914400" eaLnBrk="0" fontAlgn="base" hangingPunct="0">
+              <a:spcBef>
+                <a:spcPct val="0"/>
+              </a:spcBef>
+              <a:spcAft>
+                <a:spcPct val="0"/>
+              </a:spcAft>
+            </a:pPr>
+            <a:r>
+              <a:rPr lang="en-US" sz="1600" b="1" dirty="0">
+                <a:latin typeface="Times New Roman" pitchFamily="18" charset="0"/>
+                <a:cs typeface="Times New Roman" pitchFamily="18" charset="0"/>
+              </a:rPr>
+              <a:t>KAUTILYA K BHAT</a:t>
+            </a:r>
+            <a:r>
+              <a:rPr lang="en-US" sz="1100" dirty="0">
+                <a:latin typeface="Times New Roman" pitchFamily="18" charset="0"/>
+                <a:cs typeface="Times New Roman" pitchFamily="18" charset="0"/>
+              </a:rPr>
+              <a:t>        </a:t>
+            </a:r>
+            <a:r>
+              <a:rPr lang="en-US" sz="1100" dirty="0" smtClean="0">
+                <a:latin typeface="Times New Roman" pitchFamily="18" charset="0"/>
+                <a:cs typeface="Times New Roman" pitchFamily="18" charset="0"/>
+              </a:rPr>
+              <a:t>        </a:t>
+            </a:r>
+            <a:r>
+              <a:rPr lang="en-US" sz="1600" b="1" dirty="0">
+                <a:latin typeface="Times New Roman" pitchFamily="18" charset="0"/>
+                <a:cs typeface="Times New Roman" pitchFamily="18" charset="0"/>
+              </a:rPr>
+              <a:t>1SG16IS044</a:t>
+            </a:r>
+            <a:endParaRPr lang="en-US" sz="1100" dirty="0">
+              <a:latin typeface="Times New Roman" pitchFamily="18" charset="0"/>
+              <a:cs typeface="Times New Roman" pitchFamily="18" charset="0"/>
+            </a:endParaRPr>
+          </a:p>
+          <a:p>
+            <a:pPr lvl="0" algn="ctr" defTabSz="914400" eaLnBrk="0" fontAlgn="base" hangingPunct="0">
+              <a:spcBef>
+                <a:spcPct val="0"/>
+              </a:spcBef>
+              <a:spcAft>
+                <a:spcPct val="0"/>
+              </a:spcAft>
+            </a:pPr>
+            <a:r>
+              <a:rPr lang="en-US" sz="1600" b="1" dirty="0">
+                <a:latin typeface="Times New Roman" pitchFamily="18" charset="0"/>
+                <a:cs typeface="Times New Roman" pitchFamily="18" charset="0"/>
+              </a:rPr>
+              <a:t>KEERTHANA G</a:t>
+            </a:r>
+            <a:r>
+              <a:rPr lang="en-US" sz="1100" dirty="0">
+                <a:latin typeface="Times New Roman" pitchFamily="18" charset="0"/>
+                <a:cs typeface="Times New Roman" pitchFamily="18" charset="0"/>
+              </a:rPr>
+              <a:t>            </a:t>
+            </a:r>
+            <a:r>
+              <a:rPr lang="en-US" sz="1100" dirty="0" smtClean="0">
+                <a:latin typeface="Times New Roman" pitchFamily="18" charset="0"/>
+                <a:cs typeface="Times New Roman" pitchFamily="18" charset="0"/>
+              </a:rPr>
+              <a:t>              </a:t>
+            </a:r>
+            <a:r>
+              <a:rPr lang="en-US" sz="1600" b="1" dirty="0">
+                <a:latin typeface="Times New Roman" pitchFamily="18" charset="0"/>
+                <a:cs typeface="Times New Roman" pitchFamily="18" charset="0"/>
+              </a:rPr>
+              <a:t>1SG16IS045</a:t>
+            </a:r>
+            <a:endParaRPr lang="en-US" sz="1100" dirty="0">
+              <a:latin typeface="Times New Roman" pitchFamily="18" charset="0"/>
+              <a:cs typeface="Times New Roman" pitchFamily="18" charset="0"/>
+            </a:endParaRPr>
+          </a:p>
+          <a:p>
+            <a:pPr lvl="0" algn="ctr" defTabSz="914400" eaLnBrk="0" fontAlgn="base" hangingPunct="0">
+              <a:spcBef>
+                <a:spcPct val="0"/>
+              </a:spcBef>
+              <a:spcAft>
+                <a:spcPct val="0"/>
+              </a:spcAft>
+            </a:pPr>
+            <a:r>
+              <a:rPr lang="en-US" sz="1600" b="1" dirty="0">
+                <a:latin typeface="Times New Roman" pitchFamily="18" charset="0"/>
+                <a:cs typeface="Times New Roman" pitchFamily="18" charset="0"/>
+              </a:rPr>
+              <a:t>HARISH BABU</a:t>
+            </a:r>
+            <a:r>
+              <a:rPr lang="en-US" sz="1100" dirty="0">
+                <a:latin typeface="Times New Roman" pitchFamily="18" charset="0"/>
+                <a:cs typeface="Times New Roman" pitchFamily="18" charset="0"/>
+              </a:rPr>
+              <a:t>            </a:t>
+            </a:r>
+            <a:r>
+              <a:rPr lang="en-US" sz="1100" dirty="0" smtClean="0">
+                <a:latin typeface="Times New Roman" pitchFamily="18" charset="0"/>
+                <a:cs typeface="Times New Roman" pitchFamily="18" charset="0"/>
+              </a:rPr>
+              <a:t>                </a:t>
+            </a:r>
+            <a:r>
+              <a:rPr lang="en-US" sz="1600" b="1" dirty="0">
+                <a:latin typeface="Times New Roman" pitchFamily="18" charset="0"/>
+                <a:cs typeface="Times New Roman" pitchFamily="18" charset="0"/>
+              </a:rPr>
+              <a:t>1SG16IS034</a:t>
+            </a:r>
+          </a:p>
+          <a:p>
+            <a:pPr lvl="0" algn="ctr" defTabSz="914400" eaLnBrk="0" fontAlgn="base" hangingPunct="0">
+              <a:spcBef>
+                <a:spcPct val="0"/>
+              </a:spcBef>
+              <a:spcAft>
+                <a:spcPct val="0"/>
+              </a:spcAft>
+            </a:pPr>
+            <a:r>
+              <a:rPr lang="en-US" sz="1600" b="1" dirty="0">
+                <a:latin typeface="Times New Roman" pitchFamily="18" charset="0"/>
+                <a:cs typeface="Times New Roman" pitchFamily="18" charset="0"/>
+              </a:rPr>
+              <a:t>MANJUNATH S</a:t>
+            </a:r>
+            <a:r>
+              <a:rPr lang="en-US" sz="1100" dirty="0">
+                <a:latin typeface="Times New Roman" pitchFamily="18" charset="0"/>
+                <a:cs typeface="Times New Roman" pitchFamily="18" charset="0"/>
+              </a:rPr>
+              <a:t>            </a:t>
+            </a:r>
+            <a:r>
+              <a:rPr lang="en-US" sz="1100" dirty="0" smtClean="0">
+                <a:latin typeface="Times New Roman" pitchFamily="18" charset="0"/>
+                <a:cs typeface="Times New Roman" pitchFamily="18" charset="0"/>
+              </a:rPr>
+              <a:t>              </a:t>
+            </a:r>
+            <a:r>
+              <a:rPr lang="en-US" sz="1600" b="1" dirty="0">
+                <a:latin typeface="Times New Roman" pitchFamily="18" charset="0"/>
+                <a:cs typeface="Times New Roman" pitchFamily="18" charset="0"/>
+              </a:rPr>
+              <a:t>1SG16IS056</a:t>
+            </a:r>
+            <a:endParaRPr lang="en-US" sz="1100" dirty="0">
               <a:latin typeface="Times New Roman" pitchFamily="18" charset="0"/>
               <a:cs typeface="Times New Roman" pitchFamily="18" charset="0"/>
             </a:endParaRPr>
@@ -6595,7 +6622,7 @@
           <p:cNvPr id="7" name="Footer Placeholder 3">
             <a:extLst>
               <a:ext uri="{FF2B5EF4-FFF2-40B4-BE49-F238E27FC236}">
-                <a16:creationId xmlns="" xmlns:a16="http://schemas.microsoft.com/office/drawing/2014/main" id="{2313E4DE-3E6A-41B5-861B-BCDAD01923AD}"/>
+                <a16:creationId xmlns:a16="http://schemas.microsoft.com/office/drawing/2014/main" xmlns="" id="{2313E4DE-3E6A-41B5-861B-BCDAD01923AD}"/>
               </a:ext>
             </a:extLst>
           </p:cNvPr>
@@ -6641,7 +6668,7 @@
           <p:cNvPr id="5" name="Slide Number Placeholder 4">
             <a:extLst>
               <a:ext uri="{FF2B5EF4-FFF2-40B4-BE49-F238E27FC236}">
-                <a16:creationId xmlns="" xmlns:a16="http://schemas.microsoft.com/office/drawing/2014/main" id="{48EDC0E1-3645-47ED-B4FF-7018AB18EF33}"/>
+                <a16:creationId xmlns:a16="http://schemas.microsoft.com/office/drawing/2014/main" xmlns="" id="{48EDC0E1-3645-47ED-B4FF-7018AB18EF33}"/>
               </a:ext>
             </a:extLst>
           </p:cNvPr>
@@ -6671,7 +6698,7 @@
           <p:cNvPr id="2" name="Title 1">
             <a:extLst>
               <a:ext uri="{FF2B5EF4-FFF2-40B4-BE49-F238E27FC236}">
-                <a16:creationId xmlns="" xmlns:a16="http://schemas.microsoft.com/office/drawing/2014/main" id="{E6F2903E-24A6-498E-9FA6-D5411F751FA2}"/>
+                <a16:creationId xmlns:a16="http://schemas.microsoft.com/office/drawing/2014/main" xmlns="" id="{E6F2903E-24A6-498E-9FA6-D5411F751FA2}"/>
               </a:ext>
             </a:extLst>
           </p:cNvPr>
@@ -6989,7 +7016,7 @@
           <p:cNvPr id="5" name="Picture 4">
             <a:extLst>
               <a:ext uri="{FF2B5EF4-FFF2-40B4-BE49-F238E27FC236}">
-                <a16:creationId xmlns="" xmlns:a16="http://schemas.microsoft.com/office/drawing/2014/main" id="{51C8409F-2F6F-4F11-8030-611BF063608E}"/>
+                <a16:creationId xmlns:a16="http://schemas.microsoft.com/office/drawing/2014/main" xmlns="" id="{51C8409F-2F6F-4F11-8030-611BF063608E}"/>
               </a:ext>
             </a:extLst>
           </p:cNvPr>
@@ -7226,7 +7253,7 @@
           <p:cNvPr id="5" name="Picture 4">
             <a:extLst>
               <a:ext uri="{FF2B5EF4-FFF2-40B4-BE49-F238E27FC236}">
-                <a16:creationId xmlns="" xmlns:a16="http://schemas.microsoft.com/office/drawing/2014/main" id="{26A1F9E0-8BFE-4E90-B540-FBC41BFD3940}"/>
+                <a16:creationId xmlns:a16="http://schemas.microsoft.com/office/drawing/2014/main" xmlns="" id="{26A1F9E0-8BFE-4E90-B540-FBC41BFD3940}"/>
               </a:ext>
             </a:extLst>
           </p:cNvPr>
@@ -7575,7 +7602,7 @@
           <p:cNvPr id="4" name="Footer Placeholder 3">
             <a:extLst>
               <a:ext uri="{FF2B5EF4-FFF2-40B4-BE49-F238E27FC236}">
-                <a16:creationId xmlns="" xmlns:a16="http://schemas.microsoft.com/office/drawing/2014/main" id="{CD7179FF-974E-4346-ACB8-A3A48544EE8A}"/>
+                <a16:creationId xmlns:a16="http://schemas.microsoft.com/office/drawing/2014/main" xmlns="" id="{CD7179FF-974E-4346-ACB8-A3A48544EE8A}"/>
               </a:ext>
             </a:extLst>
           </p:cNvPr>
@@ -7609,7 +7636,7 @@
           <p:cNvPr id="5" name="Slide Number Placeholder 4">
             <a:extLst>
               <a:ext uri="{FF2B5EF4-FFF2-40B4-BE49-F238E27FC236}">
-                <a16:creationId xmlns="" xmlns:a16="http://schemas.microsoft.com/office/drawing/2014/main" id="{0D8DC3DD-E034-45ED-8D56-40DD8110D2F4}"/>
+                <a16:creationId xmlns:a16="http://schemas.microsoft.com/office/drawing/2014/main" xmlns="" id="{0D8DC3DD-E034-45ED-8D56-40DD8110D2F4}"/>
               </a:ext>
             </a:extLst>
           </p:cNvPr>
@@ -7639,7 +7666,7 @@
           <p:cNvPr id="6" name="Rectangle: Rounded Corners 5">
             <a:extLst>
               <a:ext uri="{FF2B5EF4-FFF2-40B4-BE49-F238E27FC236}">
-                <a16:creationId xmlns="" xmlns:a16="http://schemas.microsoft.com/office/drawing/2014/main" id="{BF118F1F-27D9-45D6-A973-E148915038B1}"/>
+                <a16:creationId xmlns:a16="http://schemas.microsoft.com/office/drawing/2014/main" xmlns="" id="{BF118F1F-27D9-45D6-A973-E148915038B1}"/>
               </a:ext>
             </a:extLst>
           </p:cNvPr>
@@ -7703,7 +7730,7 @@
           <p:cNvPr id="9" name="Rectangle 8">
             <a:extLst>
               <a:ext uri="{FF2B5EF4-FFF2-40B4-BE49-F238E27FC236}">
-                <a16:creationId xmlns="" xmlns:a16="http://schemas.microsoft.com/office/drawing/2014/main" id="{37709CD4-BCA3-44E3-8B25-5F47C2293218}"/>
+                <a16:creationId xmlns:a16="http://schemas.microsoft.com/office/drawing/2014/main" xmlns="" id="{37709CD4-BCA3-44E3-8B25-5F47C2293218}"/>
               </a:ext>
             </a:extLst>
           </p:cNvPr>
@@ -7783,7 +7810,7 @@
           <p:cNvPr id="10" name="Diamond 9">
             <a:extLst>
               <a:ext uri="{FF2B5EF4-FFF2-40B4-BE49-F238E27FC236}">
-                <a16:creationId xmlns="" xmlns:a16="http://schemas.microsoft.com/office/drawing/2014/main" id="{F8D6B983-CF97-4133-B018-77C37677C2F3}"/>
+                <a16:creationId xmlns:a16="http://schemas.microsoft.com/office/drawing/2014/main" xmlns="" id="{F8D6B983-CF97-4133-B018-77C37677C2F3}"/>
               </a:ext>
             </a:extLst>
           </p:cNvPr>
@@ -7847,7 +7874,7 @@
           <p:cNvPr id="11" name="Diamond 10">
             <a:extLst>
               <a:ext uri="{FF2B5EF4-FFF2-40B4-BE49-F238E27FC236}">
-                <a16:creationId xmlns="" xmlns:a16="http://schemas.microsoft.com/office/drawing/2014/main" id="{8E1629EA-0E5B-4EE6-9E39-97A538A536C0}"/>
+                <a16:creationId xmlns:a16="http://schemas.microsoft.com/office/drawing/2014/main" xmlns="" id="{8E1629EA-0E5B-4EE6-9E39-97A538A536C0}"/>
               </a:ext>
             </a:extLst>
           </p:cNvPr>
@@ -7911,7 +7938,7 @@
           <p:cNvPr id="13" name="Straight Arrow Connector 12">
             <a:extLst>
               <a:ext uri="{FF2B5EF4-FFF2-40B4-BE49-F238E27FC236}">
-                <a16:creationId xmlns="" xmlns:a16="http://schemas.microsoft.com/office/drawing/2014/main" id="{C3A45141-E1DD-466B-90B5-E54DCAEC2BD6}"/>
+                <a16:creationId xmlns:a16="http://schemas.microsoft.com/office/drawing/2014/main" xmlns="" id="{C3A45141-E1DD-466B-90B5-E54DCAEC2BD6}"/>
               </a:ext>
             </a:extLst>
           </p:cNvPr>
@@ -7953,7 +7980,7 @@
           <p:cNvPr id="16" name="Straight Arrow Connector 15">
             <a:extLst>
               <a:ext uri="{FF2B5EF4-FFF2-40B4-BE49-F238E27FC236}">
-                <a16:creationId xmlns="" xmlns:a16="http://schemas.microsoft.com/office/drawing/2014/main" id="{21A5D81C-8876-48D4-89A4-5439400B7AA7}"/>
+                <a16:creationId xmlns:a16="http://schemas.microsoft.com/office/drawing/2014/main" xmlns="" id="{21A5D81C-8876-48D4-89A4-5439400B7AA7}"/>
               </a:ext>
             </a:extLst>
           </p:cNvPr>
@@ -7996,7 +8023,7 @@
           <p:cNvPr id="19" name="Straight Arrow Connector 18">
             <a:extLst>
               <a:ext uri="{FF2B5EF4-FFF2-40B4-BE49-F238E27FC236}">
-                <a16:creationId xmlns="" xmlns:a16="http://schemas.microsoft.com/office/drawing/2014/main" id="{DB1E9F01-3071-45D4-8089-767C58B6A43E}"/>
+                <a16:creationId xmlns:a16="http://schemas.microsoft.com/office/drawing/2014/main" xmlns="" id="{DB1E9F01-3071-45D4-8089-767C58B6A43E}"/>
               </a:ext>
             </a:extLst>
           </p:cNvPr>
@@ -8039,7 +8066,7 @@
           <p:cNvPr id="31" name="Straight Connector 30">
             <a:extLst>
               <a:ext uri="{FF2B5EF4-FFF2-40B4-BE49-F238E27FC236}">
-                <a16:creationId xmlns="" xmlns:a16="http://schemas.microsoft.com/office/drawing/2014/main" id="{C2B9D659-A052-477C-9B39-7E0250661F54}"/>
+                <a16:creationId xmlns:a16="http://schemas.microsoft.com/office/drawing/2014/main" xmlns="" id="{C2B9D659-A052-477C-9B39-7E0250661F54}"/>
               </a:ext>
             </a:extLst>
           </p:cNvPr>
@@ -8077,7 +8104,7 @@
           <p:cNvPr id="34" name="Straight Arrow Connector 33">
             <a:extLst>
               <a:ext uri="{FF2B5EF4-FFF2-40B4-BE49-F238E27FC236}">
-                <a16:creationId xmlns="" xmlns:a16="http://schemas.microsoft.com/office/drawing/2014/main" id="{87B037AE-6DC2-47F8-B2B5-C72F3E6921D1}"/>
+                <a16:creationId xmlns:a16="http://schemas.microsoft.com/office/drawing/2014/main" xmlns="" id="{87B037AE-6DC2-47F8-B2B5-C72F3E6921D1}"/>
               </a:ext>
             </a:extLst>
           </p:cNvPr>
@@ -8118,7 +8145,7 @@
           <p:cNvPr id="38" name="Straight Connector 37">
             <a:extLst>
               <a:ext uri="{FF2B5EF4-FFF2-40B4-BE49-F238E27FC236}">
-                <a16:creationId xmlns="" xmlns:a16="http://schemas.microsoft.com/office/drawing/2014/main" id="{FEE863A6-1513-474E-AAAA-F0B0FD2A5963}"/>
+                <a16:creationId xmlns:a16="http://schemas.microsoft.com/office/drawing/2014/main" xmlns="" id="{FEE863A6-1513-474E-AAAA-F0B0FD2A5963}"/>
               </a:ext>
             </a:extLst>
           </p:cNvPr>
@@ -8156,7 +8183,7 @@
           <p:cNvPr id="40" name="Straight Arrow Connector 39">
             <a:extLst>
               <a:ext uri="{FF2B5EF4-FFF2-40B4-BE49-F238E27FC236}">
-                <a16:creationId xmlns="" xmlns:a16="http://schemas.microsoft.com/office/drawing/2014/main" id="{CAFF8F6F-5702-4BA8-85DF-ACEF3A3DA5D4}"/>
+                <a16:creationId xmlns:a16="http://schemas.microsoft.com/office/drawing/2014/main" xmlns="" id="{CAFF8F6F-5702-4BA8-85DF-ACEF3A3DA5D4}"/>
               </a:ext>
             </a:extLst>
           </p:cNvPr>
@@ -8198,7 +8225,7 @@
           <p:cNvPr id="41" name="Rectangle 40">
             <a:extLst>
               <a:ext uri="{FF2B5EF4-FFF2-40B4-BE49-F238E27FC236}">
-                <a16:creationId xmlns="" xmlns:a16="http://schemas.microsoft.com/office/drawing/2014/main" id="{161054E9-FF35-4C32-807C-D406982661F5}"/>
+                <a16:creationId xmlns:a16="http://schemas.microsoft.com/office/drawing/2014/main" xmlns="" id="{161054E9-FF35-4C32-807C-D406982661F5}"/>
               </a:ext>
             </a:extLst>
           </p:cNvPr>
@@ -8262,7 +8289,7 @@
           <p:cNvPr id="43" name="Straight Arrow Connector 42">
             <a:extLst>
               <a:ext uri="{FF2B5EF4-FFF2-40B4-BE49-F238E27FC236}">
-                <a16:creationId xmlns="" xmlns:a16="http://schemas.microsoft.com/office/drawing/2014/main" id="{8A1A83BF-419D-4FD0-8F29-1B621BF62AAD}"/>
+                <a16:creationId xmlns:a16="http://schemas.microsoft.com/office/drawing/2014/main" xmlns="" id="{8A1A83BF-419D-4FD0-8F29-1B621BF62AAD}"/>
               </a:ext>
             </a:extLst>
           </p:cNvPr>
@@ -8304,7 +8331,7 @@
           <p:cNvPr id="44" name="TextBox 43">
             <a:extLst>
               <a:ext uri="{FF2B5EF4-FFF2-40B4-BE49-F238E27FC236}">
-                <a16:creationId xmlns="" xmlns:a16="http://schemas.microsoft.com/office/drawing/2014/main" id="{17B4AF03-FA1C-40DD-B4FA-D5189176CBD6}"/>
+                <a16:creationId xmlns:a16="http://schemas.microsoft.com/office/drawing/2014/main" xmlns="" id="{17B4AF03-FA1C-40DD-B4FA-D5189176CBD6}"/>
               </a:ext>
             </a:extLst>
           </p:cNvPr>
@@ -8340,7 +8367,7 @@
           <p:cNvPr id="46" name="TextBox 45">
             <a:extLst>
               <a:ext uri="{FF2B5EF4-FFF2-40B4-BE49-F238E27FC236}">
-                <a16:creationId xmlns="" xmlns:a16="http://schemas.microsoft.com/office/drawing/2014/main" id="{9C22C01E-B850-459E-A25E-F9BC77972493}"/>
+                <a16:creationId xmlns:a16="http://schemas.microsoft.com/office/drawing/2014/main" xmlns="" id="{9C22C01E-B850-459E-A25E-F9BC77972493}"/>
               </a:ext>
             </a:extLst>
           </p:cNvPr>
@@ -8376,7 +8403,7 @@
           <p:cNvPr id="47" name="TextBox 46">
             <a:extLst>
               <a:ext uri="{FF2B5EF4-FFF2-40B4-BE49-F238E27FC236}">
-                <a16:creationId xmlns="" xmlns:a16="http://schemas.microsoft.com/office/drawing/2014/main" id="{806FB049-BCB7-4670-B2C4-4BD7D7B229A7}"/>
+                <a16:creationId xmlns:a16="http://schemas.microsoft.com/office/drawing/2014/main" xmlns="" id="{806FB049-BCB7-4670-B2C4-4BD7D7B229A7}"/>
               </a:ext>
             </a:extLst>
           </p:cNvPr>
@@ -8412,7 +8439,7 @@
           <p:cNvPr id="54" name="Straight Connector 53">
             <a:extLst>
               <a:ext uri="{FF2B5EF4-FFF2-40B4-BE49-F238E27FC236}">
-                <a16:creationId xmlns="" xmlns:a16="http://schemas.microsoft.com/office/drawing/2014/main" id="{732711FA-3A9A-4034-BBBF-04D55F20090B}"/>
+                <a16:creationId xmlns:a16="http://schemas.microsoft.com/office/drawing/2014/main" xmlns="" id="{732711FA-3A9A-4034-BBBF-04D55F20090B}"/>
               </a:ext>
             </a:extLst>
           </p:cNvPr>
@@ -9405,7 +9432,7 @@
           <p:cNvPr id="3" name="Content Placeholder 2">
             <a:extLst>
               <a:ext uri="{FF2B5EF4-FFF2-40B4-BE49-F238E27FC236}">
-                <a16:creationId xmlns="" xmlns:a16="http://schemas.microsoft.com/office/drawing/2014/main" id="{D11B0A51-8079-4F4F-B06E-27BDB95ED19B}"/>
+                <a16:creationId xmlns:a16="http://schemas.microsoft.com/office/drawing/2014/main" xmlns="" id="{D11B0A51-8079-4F4F-B06E-27BDB95ED19B}"/>
               </a:ext>
             </a:extLst>
           </p:cNvPr>
@@ -9592,7 +9619,7 @@
           <p:cNvPr id="5" name="Slide Number Placeholder 4">
             <a:extLst>
               <a:ext uri="{FF2B5EF4-FFF2-40B4-BE49-F238E27FC236}">
-                <a16:creationId xmlns="" xmlns:a16="http://schemas.microsoft.com/office/drawing/2014/main" id="{313D586B-64DD-41D6-9443-293DFFFA2EC7}"/>
+                <a16:creationId xmlns:a16="http://schemas.microsoft.com/office/drawing/2014/main" xmlns="" id="{313D586B-64DD-41D6-9443-293DFFFA2EC7}"/>
               </a:ext>
             </a:extLst>
           </p:cNvPr>
@@ -9622,7 +9649,7 @@
           <p:cNvPr id="2" name="Title 1">
             <a:extLst>
               <a:ext uri="{FF2B5EF4-FFF2-40B4-BE49-F238E27FC236}">
-                <a16:creationId xmlns="" xmlns:a16="http://schemas.microsoft.com/office/drawing/2014/main" id="{298D8705-5ABB-4BEB-A95E-97E3A6AD0991}"/>
+                <a16:creationId xmlns:a16="http://schemas.microsoft.com/office/drawing/2014/main" xmlns="" id="{298D8705-5ABB-4BEB-A95E-97E3A6AD0991}"/>
               </a:ext>
             </a:extLst>
           </p:cNvPr>
@@ -10283,7 +10310,7 @@
           <p:cNvPr id="3" name="Content Placeholder 2">
             <a:extLst>
               <a:ext uri="{FF2B5EF4-FFF2-40B4-BE49-F238E27FC236}">
-                <a16:creationId xmlns="" xmlns:a16="http://schemas.microsoft.com/office/drawing/2014/main" id="{9BF142B4-5F27-4857-8C49-DE10B1FFC37A}"/>
+                <a16:creationId xmlns:a16="http://schemas.microsoft.com/office/drawing/2014/main" xmlns="" id="{9BF142B4-5F27-4857-8C49-DE10B1FFC37A}"/>
               </a:ext>
             </a:extLst>
           </p:cNvPr>
@@ -10443,7 +10470,7 @@
           <p:cNvPr id="6" name="Footer Placeholder 3">
             <a:extLst>
               <a:ext uri="{FF2B5EF4-FFF2-40B4-BE49-F238E27FC236}">
-                <a16:creationId xmlns="" xmlns:a16="http://schemas.microsoft.com/office/drawing/2014/main" id="{2313E4DE-3E6A-41B5-861B-BCDAD01923AD}"/>
+                <a16:creationId xmlns:a16="http://schemas.microsoft.com/office/drawing/2014/main" xmlns="" id="{2313E4DE-3E6A-41B5-861B-BCDAD01923AD}"/>
               </a:ext>
             </a:extLst>
           </p:cNvPr>
@@ -10489,7 +10516,7 @@
           <p:cNvPr id="5" name="Slide Number Placeholder 4">
             <a:extLst>
               <a:ext uri="{FF2B5EF4-FFF2-40B4-BE49-F238E27FC236}">
-                <a16:creationId xmlns="" xmlns:a16="http://schemas.microsoft.com/office/drawing/2014/main" id="{865A2B25-8DBB-49BE-A1DF-812DD34FEEF2}"/>
+                <a16:creationId xmlns:a16="http://schemas.microsoft.com/office/drawing/2014/main" xmlns="" id="{865A2B25-8DBB-49BE-A1DF-812DD34FEEF2}"/>
               </a:ext>
             </a:extLst>
           </p:cNvPr>
@@ -10519,7 +10546,7 @@
           <p:cNvPr id="2" name="Title 1">
             <a:extLst>
               <a:ext uri="{FF2B5EF4-FFF2-40B4-BE49-F238E27FC236}">
-                <a16:creationId xmlns="" xmlns:a16="http://schemas.microsoft.com/office/drawing/2014/main" id="{199196C2-68F6-4BDB-A8C1-2B37F1F53859}"/>
+                <a16:creationId xmlns:a16="http://schemas.microsoft.com/office/drawing/2014/main" xmlns="" id="{199196C2-68F6-4BDB-A8C1-2B37F1F53859}"/>
               </a:ext>
             </a:extLst>
           </p:cNvPr>
@@ -10594,7 +10621,7 @@
           <p:cNvPr id="2" name="Title 1">
             <a:extLst>
               <a:ext uri="{FF2B5EF4-FFF2-40B4-BE49-F238E27FC236}">
-                <a16:creationId xmlns="" xmlns:a16="http://schemas.microsoft.com/office/drawing/2014/main" id="{97F37301-DEC2-4B09-8F66-48005F362874}"/>
+                <a16:creationId xmlns:a16="http://schemas.microsoft.com/office/drawing/2014/main" xmlns="" id="{97F37301-DEC2-4B09-8F66-48005F362874}"/>
               </a:ext>
             </a:extLst>
           </p:cNvPr>
@@ -10634,7 +10661,7 @@
           <p:cNvPr id="6" name="Footer Placeholder 3">
             <a:extLst>
               <a:ext uri="{FF2B5EF4-FFF2-40B4-BE49-F238E27FC236}">
-                <a16:creationId xmlns="" xmlns:a16="http://schemas.microsoft.com/office/drawing/2014/main" id="{2313E4DE-3E6A-41B5-861B-BCDAD01923AD}"/>
+                <a16:creationId xmlns:a16="http://schemas.microsoft.com/office/drawing/2014/main" xmlns="" id="{2313E4DE-3E6A-41B5-861B-BCDAD01923AD}"/>
               </a:ext>
             </a:extLst>
           </p:cNvPr>
@@ -10683,7 +10710,7 @@
           <p:cNvPr id="5" name="Slide Number Placeholder 4">
             <a:extLst>
               <a:ext uri="{FF2B5EF4-FFF2-40B4-BE49-F238E27FC236}">
-                <a16:creationId xmlns="" xmlns:a16="http://schemas.microsoft.com/office/drawing/2014/main" id="{F022C642-C9C2-43E5-8324-C9FAB7485D5D}"/>
+                <a16:creationId xmlns:a16="http://schemas.microsoft.com/office/drawing/2014/main" xmlns="" id="{F022C642-C9C2-43E5-8324-C9FAB7485D5D}"/>
               </a:ext>
             </a:extLst>
           </p:cNvPr>
@@ -10750,7 +10777,7 @@
           <p:cNvPr id="3" name="Content Placeholder 2">
             <a:extLst>
               <a:ext uri="{FF2B5EF4-FFF2-40B4-BE49-F238E27FC236}">
-                <a16:creationId xmlns="" xmlns:a16="http://schemas.microsoft.com/office/drawing/2014/main" id="{5A00A989-56EE-48EE-87D5-EA4284918F9D}"/>
+                <a16:creationId xmlns:a16="http://schemas.microsoft.com/office/drawing/2014/main" xmlns="" id="{5A00A989-56EE-48EE-87D5-EA4284918F9D}"/>
               </a:ext>
             </a:extLst>
           </p:cNvPr>
@@ -10885,7 +10912,7 @@
           <p:cNvPr id="6" name="Footer Placeholder 3">
             <a:extLst>
               <a:ext uri="{FF2B5EF4-FFF2-40B4-BE49-F238E27FC236}">
-                <a16:creationId xmlns="" xmlns:a16="http://schemas.microsoft.com/office/drawing/2014/main" id="{2313E4DE-3E6A-41B5-861B-BCDAD01923AD}"/>
+                <a16:creationId xmlns:a16="http://schemas.microsoft.com/office/drawing/2014/main" xmlns="" id="{2313E4DE-3E6A-41B5-861B-BCDAD01923AD}"/>
               </a:ext>
             </a:extLst>
           </p:cNvPr>
@@ -10931,7 +10958,7 @@
           <p:cNvPr id="5" name="Slide Number Placeholder 4">
             <a:extLst>
               <a:ext uri="{FF2B5EF4-FFF2-40B4-BE49-F238E27FC236}">
-                <a16:creationId xmlns="" xmlns:a16="http://schemas.microsoft.com/office/drawing/2014/main" id="{CC364FF6-6E67-420A-A0A2-AE2D9ED2A8BB}"/>
+                <a16:creationId xmlns:a16="http://schemas.microsoft.com/office/drawing/2014/main" xmlns="" id="{CC364FF6-6E67-420A-A0A2-AE2D9ED2A8BB}"/>
               </a:ext>
             </a:extLst>
           </p:cNvPr>
@@ -10961,7 +10988,7 @@
           <p:cNvPr id="2" name="Title 1">
             <a:extLst>
               <a:ext uri="{FF2B5EF4-FFF2-40B4-BE49-F238E27FC236}">
-                <a16:creationId xmlns="" xmlns:a16="http://schemas.microsoft.com/office/drawing/2014/main" id="{CE811CC0-F185-42F5-B3FC-B8E4B570DB60}"/>
+                <a16:creationId xmlns:a16="http://schemas.microsoft.com/office/drawing/2014/main" xmlns="" id="{CE811CC0-F185-42F5-B3FC-B8E4B570DB60}"/>
               </a:ext>
             </a:extLst>
           </p:cNvPr>
@@ -11036,7 +11063,7 @@
           <p:cNvPr id="3" name="Content Placeholder 2">
             <a:extLst>
               <a:ext uri="{FF2B5EF4-FFF2-40B4-BE49-F238E27FC236}">
-                <a16:creationId xmlns="" xmlns:a16="http://schemas.microsoft.com/office/drawing/2014/main" id="{EB8B5B70-5ED9-4A70-922F-EB6464B20C3C}"/>
+                <a16:creationId xmlns:a16="http://schemas.microsoft.com/office/drawing/2014/main" xmlns="" id="{EB8B5B70-5ED9-4A70-922F-EB6464B20C3C}"/>
               </a:ext>
             </a:extLst>
           </p:cNvPr>
@@ -11214,7 +11241,7 @@
           <p:cNvPr id="6" name="Footer Placeholder 3">
             <a:extLst>
               <a:ext uri="{FF2B5EF4-FFF2-40B4-BE49-F238E27FC236}">
-                <a16:creationId xmlns="" xmlns:a16="http://schemas.microsoft.com/office/drawing/2014/main" id="{2313E4DE-3E6A-41B5-861B-BCDAD01923AD}"/>
+                <a16:creationId xmlns:a16="http://schemas.microsoft.com/office/drawing/2014/main" xmlns="" id="{2313E4DE-3E6A-41B5-861B-BCDAD01923AD}"/>
               </a:ext>
             </a:extLst>
           </p:cNvPr>
@@ -11260,7 +11287,7 @@
           <p:cNvPr id="5" name="Slide Number Placeholder 4">
             <a:extLst>
               <a:ext uri="{FF2B5EF4-FFF2-40B4-BE49-F238E27FC236}">
-                <a16:creationId xmlns="" xmlns:a16="http://schemas.microsoft.com/office/drawing/2014/main" id="{B4A7B600-3E00-4F58-B234-FECC502E0193}"/>
+                <a16:creationId xmlns:a16="http://schemas.microsoft.com/office/drawing/2014/main" xmlns="" id="{B4A7B600-3E00-4F58-B234-FECC502E0193}"/>
               </a:ext>
             </a:extLst>
           </p:cNvPr>
@@ -11290,7 +11317,7 @@
           <p:cNvPr id="2" name="Title 1">
             <a:extLst>
               <a:ext uri="{FF2B5EF4-FFF2-40B4-BE49-F238E27FC236}">
-                <a16:creationId xmlns="" xmlns:a16="http://schemas.microsoft.com/office/drawing/2014/main" id="{3AE5B997-945C-45A4-9CD6-ECB8A5D44A20}"/>
+                <a16:creationId xmlns:a16="http://schemas.microsoft.com/office/drawing/2014/main" xmlns="" id="{3AE5B997-945C-45A4-9CD6-ECB8A5D44A20}"/>
               </a:ext>
             </a:extLst>
           </p:cNvPr>
@@ -11370,7 +11397,7 @@
           <p:cNvPr id="3" name="Content Placeholder 2">
             <a:extLst>
               <a:ext uri="{FF2B5EF4-FFF2-40B4-BE49-F238E27FC236}">
-                <a16:creationId xmlns="" xmlns:a16="http://schemas.microsoft.com/office/drawing/2014/main" id="{A3DB5CB2-C9EA-4F0C-9373-7A82DF0E6D49}"/>
+                <a16:creationId xmlns:a16="http://schemas.microsoft.com/office/drawing/2014/main" xmlns="" id="{A3DB5CB2-C9EA-4F0C-9373-7A82DF0E6D49}"/>
               </a:ext>
             </a:extLst>
           </p:cNvPr>
@@ -11546,7 +11573,7 @@
           <p:cNvPr id="6" name="Footer Placeholder 3">
             <a:extLst>
               <a:ext uri="{FF2B5EF4-FFF2-40B4-BE49-F238E27FC236}">
-                <a16:creationId xmlns="" xmlns:a16="http://schemas.microsoft.com/office/drawing/2014/main" id="{2313E4DE-3E6A-41B5-861B-BCDAD01923AD}"/>
+                <a16:creationId xmlns:a16="http://schemas.microsoft.com/office/drawing/2014/main" xmlns="" id="{2313E4DE-3E6A-41B5-861B-BCDAD01923AD}"/>
               </a:ext>
             </a:extLst>
           </p:cNvPr>
@@ -11592,7 +11619,7 @@
           <p:cNvPr id="5" name="Slide Number Placeholder 4">
             <a:extLst>
               <a:ext uri="{FF2B5EF4-FFF2-40B4-BE49-F238E27FC236}">
-                <a16:creationId xmlns="" xmlns:a16="http://schemas.microsoft.com/office/drawing/2014/main" id="{81492514-5BD1-4235-86D3-E406A8CBCA05}"/>
+                <a16:creationId xmlns:a16="http://schemas.microsoft.com/office/drawing/2014/main" xmlns="" id="{81492514-5BD1-4235-86D3-E406A8CBCA05}"/>
               </a:ext>
             </a:extLst>
           </p:cNvPr>
@@ -11659,7 +11686,7 @@
           <p:cNvPr id="3" name="Content Placeholder 2">
             <a:extLst>
               <a:ext uri="{FF2B5EF4-FFF2-40B4-BE49-F238E27FC236}">
-                <a16:creationId xmlns="" xmlns:a16="http://schemas.microsoft.com/office/drawing/2014/main" id="{72321F84-4703-4172-9DB0-612AA5FBD1C1}"/>
+                <a16:creationId xmlns:a16="http://schemas.microsoft.com/office/drawing/2014/main" xmlns="" id="{72321F84-4703-4172-9DB0-612AA5FBD1C1}"/>
               </a:ext>
             </a:extLst>
           </p:cNvPr>
@@ -11890,7 +11917,7 @@
           <p:cNvPr id="6" name="Footer Placeholder 3">
             <a:extLst>
               <a:ext uri="{FF2B5EF4-FFF2-40B4-BE49-F238E27FC236}">
-                <a16:creationId xmlns="" xmlns:a16="http://schemas.microsoft.com/office/drawing/2014/main" id="{2313E4DE-3E6A-41B5-861B-BCDAD01923AD}"/>
+                <a16:creationId xmlns:a16="http://schemas.microsoft.com/office/drawing/2014/main" xmlns="" id="{2313E4DE-3E6A-41B5-861B-BCDAD01923AD}"/>
               </a:ext>
             </a:extLst>
           </p:cNvPr>
@@ -11936,7 +11963,7 @@
           <p:cNvPr id="5" name="Slide Number Placeholder 4">
             <a:extLst>
               <a:ext uri="{FF2B5EF4-FFF2-40B4-BE49-F238E27FC236}">
-                <a16:creationId xmlns="" xmlns:a16="http://schemas.microsoft.com/office/drawing/2014/main" id="{4386CAB4-3B68-4B91-B1A2-98C2424260CD}"/>
+                <a16:creationId xmlns:a16="http://schemas.microsoft.com/office/drawing/2014/main" xmlns="" id="{4386CAB4-3B68-4B91-B1A2-98C2424260CD}"/>
               </a:ext>
             </a:extLst>
           </p:cNvPr>
@@ -11966,7 +11993,7 @@
           <p:cNvPr id="2" name="Title 1">
             <a:extLst>
               <a:ext uri="{FF2B5EF4-FFF2-40B4-BE49-F238E27FC236}">
-                <a16:creationId xmlns="" xmlns:a16="http://schemas.microsoft.com/office/drawing/2014/main" id="{3BD81A7A-20B9-4E36-A4A8-6BEC80810AAA}"/>
+                <a16:creationId xmlns:a16="http://schemas.microsoft.com/office/drawing/2014/main" xmlns="" id="{3BD81A7A-20B9-4E36-A4A8-6BEC80810AAA}"/>
               </a:ext>
             </a:extLst>
           </p:cNvPr>
@@ -12041,7 +12068,7 @@
           <p:cNvPr id="3" name="Content Placeholder 2">
             <a:extLst>
               <a:ext uri="{FF2B5EF4-FFF2-40B4-BE49-F238E27FC236}">
-                <a16:creationId xmlns="" xmlns:a16="http://schemas.microsoft.com/office/drawing/2014/main" id="{A6DEE5E9-7D9A-4A0A-A366-AF12BBF93629}"/>
+                <a16:creationId xmlns:a16="http://schemas.microsoft.com/office/drawing/2014/main" xmlns="" id="{A6DEE5E9-7D9A-4A0A-A366-AF12BBF93629}"/>
               </a:ext>
             </a:extLst>
           </p:cNvPr>
@@ -12241,7 +12268,7 @@
           <p:cNvPr id="6" name="Footer Placeholder 3">
             <a:extLst>
               <a:ext uri="{FF2B5EF4-FFF2-40B4-BE49-F238E27FC236}">
-                <a16:creationId xmlns="" xmlns:a16="http://schemas.microsoft.com/office/drawing/2014/main" id="{2313E4DE-3E6A-41B5-861B-BCDAD01923AD}"/>
+                <a16:creationId xmlns:a16="http://schemas.microsoft.com/office/drawing/2014/main" xmlns="" id="{2313E4DE-3E6A-41B5-861B-BCDAD01923AD}"/>
               </a:ext>
             </a:extLst>
           </p:cNvPr>
@@ -12287,7 +12314,7 @@
           <p:cNvPr id="5" name="Slide Number Placeholder 4">
             <a:extLst>
               <a:ext uri="{FF2B5EF4-FFF2-40B4-BE49-F238E27FC236}">
-                <a16:creationId xmlns="" xmlns:a16="http://schemas.microsoft.com/office/drawing/2014/main" id="{4A43805F-7274-401A-A39A-A243544A5164}"/>
+                <a16:creationId xmlns:a16="http://schemas.microsoft.com/office/drawing/2014/main" xmlns="" id="{4A43805F-7274-401A-A39A-A243544A5164}"/>
               </a:ext>
             </a:extLst>
           </p:cNvPr>
@@ -12317,7 +12344,7 @@
           <p:cNvPr id="2" name="Title 1">
             <a:extLst>
               <a:ext uri="{FF2B5EF4-FFF2-40B4-BE49-F238E27FC236}">
-                <a16:creationId xmlns="" xmlns:a16="http://schemas.microsoft.com/office/drawing/2014/main" id="{86E4CD43-B881-4BA2-96A3-ED7B1BA6C085}"/>
+                <a16:creationId xmlns:a16="http://schemas.microsoft.com/office/drawing/2014/main" xmlns="" id="{86E4CD43-B881-4BA2-96A3-ED7B1BA6C085}"/>
               </a:ext>
             </a:extLst>
           </p:cNvPr>
@@ -12392,7 +12419,7 @@
           <p:cNvPr id="3" name="Content Placeholder 2">
             <a:extLst>
               <a:ext uri="{FF2B5EF4-FFF2-40B4-BE49-F238E27FC236}">
-                <a16:creationId xmlns="" xmlns:a16="http://schemas.microsoft.com/office/drawing/2014/main" id="{510CF032-64C0-4040-9792-D22334EA0C83}"/>
+                <a16:creationId xmlns:a16="http://schemas.microsoft.com/office/drawing/2014/main" xmlns="" id="{510CF032-64C0-4040-9792-D22334EA0C83}"/>
               </a:ext>
             </a:extLst>
           </p:cNvPr>
@@ -12495,7 +12522,7 @@
           <p:cNvPr id="6" name="Footer Placeholder 3">
             <a:extLst>
               <a:ext uri="{FF2B5EF4-FFF2-40B4-BE49-F238E27FC236}">
-                <a16:creationId xmlns="" xmlns:a16="http://schemas.microsoft.com/office/drawing/2014/main" id="{2313E4DE-3E6A-41B5-861B-BCDAD01923AD}"/>
+                <a16:creationId xmlns:a16="http://schemas.microsoft.com/office/drawing/2014/main" xmlns="" id="{2313E4DE-3E6A-41B5-861B-BCDAD01923AD}"/>
               </a:ext>
             </a:extLst>
           </p:cNvPr>
@@ -12541,7 +12568,7 @@
           <p:cNvPr id="5" name="Slide Number Placeholder 4">
             <a:extLst>
               <a:ext uri="{FF2B5EF4-FFF2-40B4-BE49-F238E27FC236}">
-                <a16:creationId xmlns="" xmlns:a16="http://schemas.microsoft.com/office/drawing/2014/main" id="{797F04F3-5A43-4D4C-99D6-C6E9DC340C11}"/>
+                <a16:creationId xmlns:a16="http://schemas.microsoft.com/office/drawing/2014/main" xmlns="" id="{797F04F3-5A43-4D4C-99D6-C6E9DC340C11}"/>
               </a:ext>
             </a:extLst>
           </p:cNvPr>
@@ -12571,7 +12598,7 @@
           <p:cNvPr id="2" name="Title 1">
             <a:extLst>
               <a:ext uri="{FF2B5EF4-FFF2-40B4-BE49-F238E27FC236}">
-                <a16:creationId xmlns="" xmlns:a16="http://schemas.microsoft.com/office/drawing/2014/main" id="{0A1ACCD7-65A5-4D11-8288-D4AA5941A499}"/>
+                <a16:creationId xmlns:a16="http://schemas.microsoft.com/office/drawing/2014/main" xmlns="" id="{0A1ACCD7-65A5-4D11-8288-D4AA5941A499}"/>
               </a:ext>
             </a:extLst>
           </p:cNvPr>
@@ -12869,7 +12896,7 @@
           <p:cNvPr id="7" name="Footer Placeholder 3">
             <a:extLst>
               <a:ext uri="{FF2B5EF4-FFF2-40B4-BE49-F238E27FC236}">
-                <a16:creationId xmlns="" xmlns:a16="http://schemas.microsoft.com/office/drawing/2014/main" id="{2313E4DE-3E6A-41B5-861B-BCDAD01923AD}"/>
+                <a16:creationId xmlns:a16="http://schemas.microsoft.com/office/drawing/2014/main" xmlns="" id="{2313E4DE-3E6A-41B5-861B-BCDAD01923AD}"/>
               </a:ext>
             </a:extLst>
           </p:cNvPr>
@@ -12915,7 +12942,7 @@
           <p:cNvPr id="5" name="Slide Number Placeholder 4">
             <a:extLst>
               <a:ext uri="{FF2B5EF4-FFF2-40B4-BE49-F238E27FC236}">
-                <a16:creationId xmlns="" xmlns:a16="http://schemas.microsoft.com/office/drawing/2014/main" id="{F07CF2AE-C9C4-40CB-9F97-9E26F8E7AC4F}"/>
+                <a16:creationId xmlns:a16="http://schemas.microsoft.com/office/drawing/2014/main" xmlns="" id="{F07CF2AE-C9C4-40CB-9F97-9E26F8E7AC4F}"/>
               </a:ext>
             </a:extLst>
           </p:cNvPr>
@@ -12945,7 +12972,7 @@
           <p:cNvPr id="2" name="Title 1">
             <a:extLst>
               <a:ext uri="{FF2B5EF4-FFF2-40B4-BE49-F238E27FC236}">
-                <a16:creationId xmlns="" xmlns:a16="http://schemas.microsoft.com/office/drawing/2014/main" id="{42DDA449-7163-48A7-98D6-C7D74460868B}"/>
+                <a16:creationId xmlns:a16="http://schemas.microsoft.com/office/drawing/2014/main" xmlns="" id="{42DDA449-7163-48A7-98D6-C7D74460868B}"/>
               </a:ext>
             </a:extLst>
           </p:cNvPr>
@@ -13574,7 +13601,7 @@
   <a:extraClrSchemeLst/>
   <a:extLst>
     <a:ext uri="{05A4C25C-085E-4340-85A3-A5531E510DB2}">
-      <thm15:themeFamily xmlns="" xmlns:thm15="http://schemas.microsoft.com/office/thememl/2012/main" name="Office Theme" id="{62F939B6-93AF-4DB8-9C6B-D6C7DFDC589F}" vid="{4A3C46E8-61CC-4603-A589-7422A47A8E4A}"/>
+      <thm15:themeFamily xmlns:thm15="http://schemas.microsoft.com/office/thememl/2012/main" xmlns="" name="Office Theme" id="{62F939B6-93AF-4DB8-9C6B-D6C7DFDC589F}" vid="{4A3C46E8-61CC-4603-A589-7422A47A8E4A}"/>
     </a:ext>
   </a:extLst>
 </a:theme>

</xml_diff>